<commit_message>
keywords, cron, video prototype
</commit_message>
<xml_diff>
--- a/bits-and-pieces/presentation..pptx
+++ b/bits-and-pieces/presentation..pptx
@@ -1616,7 +1616,7 @@
               <a:rPr b="0" lang="en-GB" sz="1400" spc="-1" strike="noStrike">
                 <a:latin typeface="Times New Roman"/>
               </a:rPr>
-              <a:t> </a:t>
+              <a:t>&lt;date/time&gt;</a:t>
             </a:r>
             <a:endParaRPr b="0" lang="en-GB" sz="1400" spc="-1" strike="noStrike">
               <a:latin typeface="Times New Roman"/>
@@ -1651,7 +1651,7 @@
               <a:rPr b="0" lang="en-GB" sz="1400" spc="-1" strike="noStrike">
                 <a:latin typeface="Times New Roman"/>
               </a:rPr>
-              <a:t> </a:t>
+              <a:t>&lt;footer&gt;</a:t>
             </a:r>
             <a:endParaRPr b="0" lang="en-GB" sz="1400" spc="-1" strike="noStrike">
               <a:latin typeface="Times New Roman"/>
@@ -1682,11 +1682,11 @@
           <a:bodyPr lIns="0" rIns="0" tIns="0" bIns="0"/>
           <a:p>
             <a:pPr algn="r"/>
-            <a:fld id="{FDF2A12E-0181-4614-A905-C8364E096EDD}" type="slidenum">
+            <a:fld id="{087D6BEE-6E3E-44AC-AD7C-12EFDAE02A20}" type="slidenum">
               <a:rPr b="0" lang="en-GB" sz="1400" spc="-1" strike="noStrike">
                 <a:latin typeface="Times New Roman"/>
               </a:rPr>
-              <a:t>15</a:t>
+              <a:t>&lt;number&gt;</a:t>
             </a:fld>
             <a:endParaRPr b="0" lang="en-GB" sz="1400" spc="-1" strike="noStrike">
               <a:latin typeface="Times New Roman"/>
@@ -1921,7 +1921,13 @@
               <a:rPr b="0" lang="en-GB" sz="3200" spc="-1" strike="noStrike">
                 <a:latin typeface="Arial"/>
               </a:rPr>
-              <a:t>Small Python programs that (usually) run an OS level task</a:t>
+              <a:t>Small Python programs that (usually) run an </a:t>
+            </a:r>
+            <a:r>
+              <a:rPr b="0" lang="en-GB" sz="3200" spc="-1" strike="noStrike">
+                <a:latin typeface="Arial"/>
+              </a:rPr>
+              <a:t>OS level task</a:t>
             </a:r>
             <a:endParaRPr b="0" lang="en-GB" sz="3200" spc="-1" strike="noStrike">
               <a:latin typeface="Arial"/>
@@ -1949,7 +1955,13 @@
               <a:rPr b="0" lang="en-GB" sz="2400" spc="-1" strike="noStrike">
                 <a:latin typeface="Courier New"/>
               </a:rPr>
-              <a:t>arecord -q -f cd -c 2 -D hw:0,0 --duration 30 </a:t>
+              <a:t>arecord -q -f cd -c 2 -D hw:0,0 </a:t>
+            </a:r>
+            <a:r>
+              <a:rPr b="0" lang="en-GB" sz="2400" spc="-1" strike="noStrike">
+                <a:latin typeface="Courier New"/>
+              </a:rPr>
+              <a:t>--duration 30 </a:t>
             </a:r>
             <a:r>
               <a:rPr b="0" lang="en-GB" sz="3200" spc="-1" strike="noStrike">
@@ -1995,29 +2007,41 @@
               <a:rPr b="0" lang="en-GB" sz="3200" spc="-1" strike="noStrike">
                 <a:latin typeface="Arial"/>
               </a:rPr>
-              <a:t> so can experiment/debug</a:t>
-            </a:r>
-            <a:endParaRPr b="0" lang="en-GB" sz="3200" spc="-1" strike="noStrike">
-              <a:latin typeface="Arial"/>
-            </a:endParaRPr>
-          </a:p>
-          <a:p>
-            <a:pPr marL="432000" indent="-324000">
-              <a:spcBef>
-                <a:spcPts val="1417"/>
-              </a:spcBef>
-              <a:buClr>
-                <a:srgbClr val="000000"/>
-              </a:buClr>
-              <a:buSzPct val="45000"/>
-              <a:buFont typeface="Wingdings" charset="2"/>
-              <a:buChar char=""/>
-            </a:pPr>
-            <a:r>
-              <a:rPr b="0" lang="en-GB" sz="3200" spc="-1" strike="noStrike">
-                <a:latin typeface="Arial"/>
-              </a:rPr>
-              <a:t>Control external AI (transcription etc.) this can be turned off in </a:t>
+              <a:t> </a:t>
+            </a:r>
+            <a:r>
+              <a:rPr b="0" lang="en-GB" sz="3200" spc="-1" strike="noStrike">
+                <a:latin typeface="Arial"/>
+              </a:rPr>
+              <a:t>so can experiment/debug</a:t>
+            </a:r>
+            <a:endParaRPr b="0" lang="en-GB" sz="3200" spc="-1" strike="noStrike">
+              <a:latin typeface="Arial"/>
+            </a:endParaRPr>
+          </a:p>
+          <a:p>
+            <a:pPr marL="432000" indent="-324000">
+              <a:spcBef>
+                <a:spcPts val="1417"/>
+              </a:spcBef>
+              <a:buClr>
+                <a:srgbClr val="000000"/>
+              </a:buClr>
+              <a:buSzPct val="45000"/>
+              <a:buFont typeface="Wingdings" charset="2"/>
+              <a:buChar char=""/>
+            </a:pPr>
+            <a:r>
+              <a:rPr b="0" lang="en-GB" sz="3200" spc="-1" strike="noStrike">
+                <a:latin typeface="Arial"/>
+              </a:rPr>
+              <a:t>Control external AI (transcription etc.) this can </a:t>
+            </a:r>
+            <a:r>
+              <a:rPr b="0" lang="en-GB" sz="3200" spc="-1" strike="noStrike">
+                <a:latin typeface="Arial"/>
+              </a:rPr>
+              <a:t>be turned off in </a:t>
             </a:r>
             <a:r>
               <a:rPr b="0" lang="en-GB" sz="2200" spc="-1" strike="noStrike">
@@ -3076,7 +3100,7 @@
               <a:rPr b="0" lang="en-GB" sz="3200" spc="-1" strike="noStrike">
                 <a:latin typeface="Arial"/>
               </a:rPr>
-              <a:t>Licence given assorted licences for components</a:t>
+              <a:t>Licence given the assorted licences for components</a:t>
             </a:r>
             <a:endParaRPr b="0" lang="en-GB" sz="3200" spc="-1" strike="noStrike">
               <a:latin typeface="Arial"/>
@@ -3738,41 +3762,29 @@
               <a:rPr b="0" lang="en-GB" sz="3200" spc="-1" strike="noStrike">
                 <a:latin typeface="Arial"/>
               </a:rPr>
-              <a:t>Think Alexis or Mycroft, open source home </a:t>
-            </a:r>
-            <a:r>
-              <a:rPr b="0" lang="en-GB" sz="3200" spc="-1" strike="noStrike">
-                <a:latin typeface="Arial"/>
-              </a:rPr>
-              <a:t>assistant (HA) with voice command</a:t>
-            </a:r>
-            <a:endParaRPr b="0" lang="en-GB" sz="3200" spc="-1" strike="noStrike">
-              <a:latin typeface="Arial"/>
-            </a:endParaRPr>
-          </a:p>
-          <a:p>
-            <a:pPr marL="432000" indent="-324000">
-              <a:spcBef>
-                <a:spcPts val="1417"/>
-              </a:spcBef>
-              <a:buClr>
-                <a:srgbClr val="000000"/>
-              </a:buClr>
-              <a:buSzPct val="45000"/>
-              <a:buFont typeface="Wingdings" charset="2"/>
-              <a:buChar char=""/>
-            </a:pPr>
-            <a:r>
-              <a:rPr b="0" lang="en-GB" sz="3200" spc="-1" strike="noStrike">
-                <a:latin typeface="Arial"/>
-              </a:rPr>
-              <a:t>I rejected Mycroft because it's tightly linked to </a:t>
-            </a:r>
-            <a:r>
-              <a:rPr b="0" lang="en-GB" sz="3200" spc="-1" strike="noStrike">
-                <a:latin typeface="Arial"/>
-              </a:rPr>
-              <a:t>the cloud, Rhasspy gives 'choice'</a:t>
+              <a:t>Think Alexis or Mycroft, open source home assistant (HA) with voice command</a:t>
+            </a:r>
+            <a:endParaRPr b="0" lang="en-GB" sz="3200" spc="-1" strike="noStrike">
+              <a:latin typeface="Arial"/>
+            </a:endParaRPr>
+          </a:p>
+          <a:p>
+            <a:pPr marL="432000" indent="-324000">
+              <a:spcBef>
+                <a:spcPts val="1417"/>
+              </a:spcBef>
+              <a:buClr>
+                <a:srgbClr val="000000"/>
+              </a:buClr>
+              <a:buSzPct val="45000"/>
+              <a:buFont typeface="Wingdings" charset="2"/>
+              <a:buChar char=""/>
+            </a:pPr>
+            <a:r>
+              <a:rPr b="0" lang="en-GB" sz="3200" spc="-1" strike="noStrike">
+                <a:latin typeface="Arial"/>
+              </a:rPr>
+              <a:t>I rejected Mycroft because it's tightly linked to the cloud, Rhasspy gives 'choice'</a:t>
             </a:r>
             <a:endParaRPr b="0" lang="en-GB" sz="3200" spc="-1" strike="noStrike">
               <a:latin typeface="Arial"/>
@@ -4845,29 +4857,41 @@
               <a:rPr b="0" lang="en-GB" sz="3200" spc="-1" strike="noStrike">
                 <a:latin typeface="Arial"/>
               </a:rPr>
-              <a:t>Takes an Intent (take photo, for example) and dispatches to a specialised program</a:t>
-            </a:r>
-            <a:endParaRPr b="0" lang="en-GB" sz="3200" spc="-1" strike="noStrike">
-              <a:latin typeface="Arial"/>
-            </a:endParaRPr>
-          </a:p>
-          <a:p>
-            <a:pPr marL="432000" indent="-324000">
-              <a:spcBef>
-                <a:spcPts val="1417"/>
-              </a:spcBef>
-              <a:buClr>
-                <a:srgbClr val="000000"/>
-              </a:buClr>
-              <a:buSzPct val="45000"/>
-              <a:buFont typeface="Wingdings" charset="2"/>
-              <a:buChar char=""/>
-            </a:pPr>
-            <a:r>
-              <a:rPr b="0" lang="en-GB" sz="3200" spc="-1" strike="noStrike">
-                <a:latin typeface="Arial"/>
-              </a:rPr>
-              <a:t>Dispatch table for intents (can be done in Node-Red) but finer control here</a:t>
+              <a:t>Takes an Intent (take photo, for example) and </a:t>
+            </a:r>
+            <a:r>
+              <a:rPr b="0" lang="en-GB" sz="3200" spc="-1" strike="noStrike">
+                <a:latin typeface="Arial"/>
+              </a:rPr>
+              <a:t>dispatches to a specialised program</a:t>
+            </a:r>
+            <a:endParaRPr b="0" lang="en-GB" sz="3200" spc="-1" strike="noStrike">
+              <a:latin typeface="Arial"/>
+            </a:endParaRPr>
+          </a:p>
+          <a:p>
+            <a:pPr marL="432000" indent="-324000">
+              <a:spcBef>
+                <a:spcPts val="1417"/>
+              </a:spcBef>
+              <a:buClr>
+                <a:srgbClr val="000000"/>
+              </a:buClr>
+              <a:buSzPct val="45000"/>
+              <a:buFont typeface="Wingdings" charset="2"/>
+              <a:buChar char=""/>
+            </a:pPr>
+            <a:r>
+              <a:rPr b="0" lang="en-GB" sz="3200" spc="-1" strike="noStrike">
+                <a:latin typeface="Arial"/>
+              </a:rPr>
+              <a:t>Dispatch table for intents (can be done in </a:t>
+            </a:r>
+            <a:r>
+              <a:rPr b="0" lang="en-GB" sz="3200" spc="-1" strike="noStrike">
+                <a:latin typeface="Arial"/>
+              </a:rPr>
+              <a:t>Node-Red) but finer control here</a:t>
             </a:r>
             <a:endParaRPr b="0" lang="en-GB" sz="3200" spc="-1" strike="noStrike">
               <a:latin typeface="Arial"/>

</xml_diff>